<commit_message>
updated app architecture sketches
</commit_message>
<xml_diff>
--- a/yelb-architecture.pptx
+++ b/yelb-architecture.pptx
@@ -243,7 +243,7 @@
           <a:p>
             <a:fld id="{919FEB60-5DE5-5248-904E-A9BB651676DE}" type="datetimeFigureOut">
               <a:rPr lang="en-US" smtClean="0"/>
-              <a:t>10/31/17</a:t>
+              <a:t>12/5/17</a:t>
             </a:fld>
             <a:endParaRPr lang="en-US" dirty="0"/>
           </a:p>
@@ -413,7 +413,7 @@
           <a:p>
             <a:fld id="{919FEB60-5DE5-5248-904E-A9BB651676DE}" type="datetimeFigureOut">
               <a:rPr lang="en-US" smtClean="0"/>
-              <a:t>10/31/17</a:t>
+              <a:t>12/5/17</a:t>
             </a:fld>
             <a:endParaRPr lang="en-US" dirty="0"/>
           </a:p>
@@ -593,7 +593,7 @@
           <a:p>
             <a:fld id="{919FEB60-5DE5-5248-904E-A9BB651676DE}" type="datetimeFigureOut">
               <a:rPr lang="en-US" smtClean="0"/>
-              <a:t>10/31/17</a:t>
+              <a:t>12/5/17</a:t>
             </a:fld>
             <a:endParaRPr lang="en-US" dirty="0"/>
           </a:p>
@@ -763,7 +763,7 @@
           <a:p>
             <a:fld id="{919FEB60-5DE5-5248-904E-A9BB651676DE}" type="datetimeFigureOut">
               <a:rPr lang="en-US" smtClean="0"/>
-              <a:t>10/31/17</a:t>
+              <a:t>12/5/17</a:t>
             </a:fld>
             <a:endParaRPr lang="en-US" dirty="0"/>
           </a:p>
@@ -1009,7 +1009,7 @@
           <a:p>
             <a:fld id="{919FEB60-5DE5-5248-904E-A9BB651676DE}" type="datetimeFigureOut">
               <a:rPr lang="en-US" smtClean="0"/>
-              <a:t>10/31/17</a:t>
+              <a:t>12/5/17</a:t>
             </a:fld>
             <a:endParaRPr lang="en-US" dirty="0"/>
           </a:p>
@@ -1241,7 +1241,7 @@
           <a:p>
             <a:fld id="{919FEB60-5DE5-5248-904E-A9BB651676DE}" type="datetimeFigureOut">
               <a:rPr lang="en-US" smtClean="0"/>
-              <a:t>10/31/17</a:t>
+              <a:t>12/5/17</a:t>
             </a:fld>
             <a:endParaRPr lang="en-US" dirty="0"/>
           </a:p>
@@ -1608,7 +1608,7 @@
           <a:p>
             <a:fld id="{919FEB60-5DE5-5248-904E-A9BB651676DE}" type="datetimeFigureOut">
               <a:rPr lang="en-US" smtClean="0"/>
-              <a:t>10/31/17</a:t>
+              <a:t>12/5/17</a:t>
             </a:fld>
             <a:endParaRPr lang="en-US" dirty="0"/>
           </a:p>
@@ -1726,7 +1726,7 @@
           <a:p>
             <a:fld id="{919FEB60-5DE5-5248-904E-A9BB651676DE}" type="datetimeFigureOut">
               <a:rPr lang="en-US" smtClean="0"/>
-              <a:t>10/31/17</a:t>
+              <a:t>12/5/17</a:t>
             </a:fld>
             <a:endParaRPr lang="en-US" dirty="0"/>
           </a:p>
@@ -1821,7 +1821,7 @@
           <a:p>
             <a:fld id="{919FEB60-5DE5-5248-904E-A9BB651676DE}" type="datetimeFigureOut">
               <a:rPr lang="en-US" smtClean="0"/>
-              <a:t>10/31/17</a:t>
+              <a:t>12/5/17</a:t>
             </a:fld>
             <a:endParaRPr lang="en-US" dirty="0"/>
           </a:p>
@@ -2098,7 +2098,7 @@
           <a:p>
             <a:fld id="{919FEB60-5DE5-5248-904E-A9BB651676DE}" type="datetimeFigureOut">
               <a:rPr lang="en-US" smtClean="0"/>
-              <a:t>10/31/17</a:t>
+              <a:t>12/5/17</a:t>
             </a:fld>
             <a:endParaRPr lang="en-US" dirty="0"/>
           </a:p>
@@ -2351,7 +2351,7 @@
           <a:p>
             <a:fld id="{919FEB60-5DE5-5248-904E-A9BB651676DE}" type="datetimeFigureOut">
               <a:rPr lang="en-US" smtClean="0"/>
-              <a:t>10/31/17</a:t>
+              <a:t>12/5/17</a:t>
             </a:fld>
             <a:endParaRPr lang="en-US" dirty="0"/>
           </a:p>
@@ -2564,7 +2564,7 @@
           <a:p>
             <a:fld id="{919FEB60-5DE5-5248-904E-A9BB651676DE}" type="datetimeFigureOut">
               <a:rPr lang="en-US" smtClean="0"/>
-              <a:t>10/31/17</a:t>
+              <a:t>12/5/17</a:t>
             </a:fld>
             <a:endParaRPr lang="en-US" dirty="0"/>
           </a:p>
@@ -3147,122 +3147,6 @@
           </a:p>
         </p:txBody>
       </p:sp>
-      <p:sp>
-        <p:nvSpPr>
-          <p:cNvPr id="6" name="Can 5"/>
-          <p:cNvSpPr/>
-          <p:nvPr/>
-        </p:nvSpPr>
-        <p:spPr>
-          <a:xfrm>
-            <a:off x="10225733" y="5019472"/>
-            <a:ext cx="1213995" cy="793499"/>
-          </a:xfrm>
-          <a:prstGeom prst="can">
-            <a:avLst/>
-          </a:prstGeom>
-          <a:noFill/>
-          <a:ln w="38100">
-            <a:solidFill>
-              <a:srgbClr val="FF0000"/>
-            </a:solidFill>
-          </a:ln>
-        </p:spPr>
-        <p:style>
-          <a:lnRef idx="2">
-            <a:schemeClr val="accent1">
-              <a:shade val="50000"/>
-            </a:schemeClr>
-          </a:lnRef>
-          <a:fillRef idx="1">
-            <a:schemeClr val="accent1"/>
-          </a:fillRef>
-          <a:effectRef idx="0">
-            <a:schemeClr val="accent1"/>
-          </a:effectRef>
-          <a:fontRef idx="minor">
-            <a:schemeClr val="lt1"/>
-          </a:fontRef>
-        </p:style>
-        <p:txBody>
-          <a:bodyPr rtlCol="0" anchor="ctr"/>
-          <a:lstStyle/>
-          <a:p>
-            <a:pPr algn="ctr"/>
-            <a:endParaRPr lang="en-US" b="1" i="1" dirty="0">
-              <a:solidFill>
-                <a:schemeClr val="tx1"/>
-              </a:solidFill>
-            </a:endParaRPr>
-          </a:p>
-          <a:p>
-            <a:pPr algn="ctr"/>
-            <a:r>
-              <a:rPr lang="en-US" b="1" i="1" dirty="0" smtClean="0">
-                <a:solidFill>
-                  <a:schemeClr val="tx1"/>
-                </a:solidFill>
-              </a:rPr>
-              <a:t>y</a:t>
-            </a:r>
-            <a:r>
-              <a:rPr lang="en-US" b="1" i="1" dirty="0" smtClean="0">
-                <a:solidFill>
-                  <a:schemeClr val="tx1"/>
-                </a:solidFill>
-              </a:rPr>
-              <a:t>elb-cache</a:t>
-            </a:r>
-            <a:endParaRPr lang="en-US" b="1" i="1" dirty="0">
-              <a:solidFill>
-                <a:schemeClr val="tx1"/>
-              </a:solidFill>
-            </a:endParaRPr>
-          </a:p>
-        </p:txBody>
-      </p:sp>
-      <p:cxnSp>
-        <p:nvCxnSpPr>
-          <p:cNvPr id="10" name="Elbow Connector 9"/>
-          <p:cNvCxnSpPr>
-            <a:stCxn id="6" idx="2"/>
-            <a:endCxn id="5" idx="3"/>
-          </p:cNvCxnSpPr>
-          <p:nvPr/>
-        </p:nvCxnSpPr>
-        <p:spPr>
-          <a:xfrm rot="10800000">
-            <a:off x="8795659" y="4621212"/>
-            <a:ext cx="1430075" cy="795010"/>
-          </a:xfrm>
-          <a:prstGeom prst="bentConnector3">
-            <a:avLst>
-              <a:gd name="adj1" fmla="val 50000"/>
-            </a:avLst>
-          </a:prstGeom>
-          <a:ln w="19050">
-            <a:solidFill>
-              <a:schemeClr val="tx1"/>
-            </a:solidFill>
-            <a:headEnd type="triangle"/>
-            <a:tailEnd type="triangle"/>
-          </a:ln>
-        </p:spPr>
-        <p:style>
-          <a:lnRef idx="1">
-            <a:schemeClr val="accent1"/>
-          </a:lnRef>
-          <a:fillRef idx="0">
-            <a:schemeClr val="accent1"/>
-          </a:fillRef>
-          <a:effectRef idx="0">
-            <a:schemeClr val="accent1"/>
-          </a:effectRef>
-          <a:fontRef idx="minor">
-            <a:schemeClr val="tx1"/>
-          </a:fontRef>
-        </p:style>
-      </p:cxnSp>
       <p:cxnSp>
         <p:nvCxnSpPr>
           <p:cNvPr id="13" name="Elbow Connector 12"/>
@@ -3781,7 +3665,7 @@
         </p:nvSpPr>
         <p:spPr>
           <a:xfrm>
-            <a:off x="9289239" y="4128634"/>
+            <a:off x="6979785" y="6177064"/>
             <a:ext cx="442913" cy="370114"/>
           </a:xfrm>
           <a:prstGeom prst="ellipse">
@@ -4013,63 +3897,6 @@
       </p:cxnSp>
       <p:sp>
         <p:nvSpPr>
-          <p:cNvPr id="39" name="Rounded Rectangle 38"/>
-          <p:cNvSpPr/>
-          <p:nvPr/>
-        </p:nvSpPr>
-        <p:spPr>
-          <a:xfrm>
-            <a:off x="10440962" y="5291845"/>
-            <a:ext cx="822450" cy="194292"/>
-          </a:xfrm>
-          <a:prstGeom prst="roundRect">
-            <a:avLst/>
-          </a:prstGeom>
-          <a:solidFill>
-            <a:srgbClr val="FF0000">
-              <a:alpha val="74000"/>
-            </a:srgbClr>
-          </a:solidFill>
-          <a:ln>
-            <a:solidFill>
-              <a:schemeClr val="accent1">
-                <a:lumMod val="60000"/>
-                <a:lumOff val="40000"/>
-              </a:schemeClr>
-            </a:solidFill>
-          </a:ln>
-        </p:spPr>
-        <p:style>
-          <a:lnRef idx="2">
-            <a:schemeClr val="accent1">
-              <a:shade val="50000"/>
-            </a:schemeClr>
-          </a:lnRef>
-          <a:fillRef idx="1">
-            <a:schemeClr val="accent1"/>
-          </a:fillRef>
-          <a:effectRef idx="0">
-            <a:schemeClr val="accent1"/>
-          </a:effectRef>
-          <a:fontRef idx="minor">
-            <a:schemeClr val="lt1"/>
-          </a:fontRef>
-        </p:style>
-        <p:txBody>
-          <a:bodyPr rtlCol="0" anchor="ctr"/>
-          <a:lstStyle/>
-          <a:p>
-            <a:pPr algn="ctr"/>
-            <a:r>
-              <a:rPr lang="en-US" b="1" i="1" dirty="0" smtClean="0"/>
-              <a:t>redis</a:t>
-            </a:r>
-            <a:endParaRPr lang="en-US" b="1" i="1" dirty="0"/>
-          </a:p>
-        </p:txBody>
-      </p:sp>
-      <p:sp>
-        <p:nvSpPr>
           <p:cNvPr id="41" name="Rounded Rectangle 40"/>
           <p:cNvSpPr/>
           <p:nvPr/>
@@ -4122,64 +3949,6 @@
               <a:t>Postgres</a:t>
             </a:r>
             <a:endParaRPr lang="en-US" b="1" i="1" dirty="0"/>
-          </a:p>
-        </p:txBody>
-      </p:sp>
-      <p:sp>
-        <p:nvSpPr>
-          <p:cNvPr id="42" name="Oval 41"/>
-          <p:cNvSpPr/>
-          <p:nvPr/>
-        </p:nvSpPr>
-        <p:spPr>
-          <a:xfrm>
-            <a:off x="7201242" y="6114288"/>
-            <a:ext cx="442913" cy="370114"/>
-          </a:xfrm>
-          <a:prstGeom prst="ellipse">
-            <a:avLst/>
-          </a:prstGeom>
-          <a:noFill/>
-          <a:ln w="28575">
-            <a:solidFill>
-              <a:schemeClr val="tx1"/>
-            </a:solidFill>
-          </a:ln>
-        </p:spPr>
-        <p:style>
-          <a:lnRef idx="2">
-            <a:schemeClr val="accent1">
-              <a:shade val="50000"/>
-            </a:schemeClr>
-          </a:lnRef>
-          <a:fillRef idx="1">
-            <a:schemeClr val="accent1"/>
-          </a:fillRef>
-          <a:effectRef idx="0">
-            <a:schemeClr val="accent1"/>
-          </a:effectRef>
-          <a:fontRef idx="minor">
-            <a:schemeClr val="lt1"/>
-          </a:fontRef>
-        </p:style>
-        <p:txBody>
-          <a:bodyPr rtlCol="0" anchor="ctr"/>
-          <a:lstStyle/>
-          <a:p>
-            <a:pPr algn="ctr"/>
-            <a:r>
-              <a:rPr lang="en-US" dirty="0" smtClean="0">
-                <a:solidFill>
-                  <a:schemeClr val="tx1"/>
-                </a:solidFill>
-              </a:rPr>
-              <a:t>5</a:t>
-            </a:r>
-            <a:endParaRPr lang="en-US" dirty="0">
-              <a:solidFill>
-                <a:schemeClr val="tx1"/>
-              </a:solidFill>
-            </a:endParaRPr>
           </a:p>
         </p:txBody>
       </p:sp>

</xml_diff>